<commit_message>
update note on Wireshark
</commit_message>
<xml_diff>
--- a/Wireshark/TCP三次握手，四次挥手.pptx
+++ b/Wireshark/TCP三次握手，四次挥手.pptx
@@ -6,10 +6,11 @@
   </p:sldMasterIdLst>
   <p:sldIdLst>
     <p:sldId id="256" r:id="rId2"/>
-    <p:sldId id="257" r:id="rId3"/>
-    <p:sldId id="258" r:id="rId4"/>
-    <p:sldId id="259" r:id="rId5"/>
-    <p:sldId id="260" r:id="rId6"/>
+    <p:sldId id="261" r:id="rId3"/>
+    <p:sldId id="257" r:id="rId4"/>
+    <p:sldId id="258" r:id="rId5"/>
+    <p:sldId id="259" r:id="rId6"/>
+    <p:sldId id="260" r:id="rId7"/>
   </p:sldIdLst>
   <p:sldSz cx="9144000" cy="6858000" type="screen4x3"/>
   <p:notesSz cx="6858000" cy="9144000"/>
@@ -108,6 +109,22 @@
       </a:defRPr>
     </a:lvl9pPr>
   </p:defaultTextStyle>
+  <p:extLst>
+    <p:ext uri="{EFAFB233-063F-42B5-8137-9DF3F51BA10A}">
+      <p15:sldGuideLst xmlns:p15="http://schemas.microsoft.com/office/powerpoint/2012/main">
+        <p15:guide id="1" orient="horz" pos="2160">
+          <p15:clr>
+            <a:srgbClr val="A4A3A4"/>
+          </p15:clr>
+        </p15:guide>
+        <p15:guide id="2" pos="2880">
+          <p15:clr>
+            <a:srgbClr val="A4A3A4"/>
+          </p15:clr>
+        </p15:guide>
+      </p15:sldGuideLst>
+    </p:ext>
+  </p:extLst>
 </p:presentation>
 </file>
 
@@ -149,10 +166,9 @@
           <a:lstStyle/>
           <a:p>
             <a:r>
-              <a:rPr lang="zh-CN" altLang="en-US" smtClean="0"/>
+              <a:rPr lang="zh-CN" altLang="en-US"/>
               <a:t>单击此处编辑母版标题样式</a:t>
             </a:r>
-            <a:endParaRPr lang="zh-CN" altLang="en-US"/>
           </a:p>
         </p:txBody>
       </p:sp>
@@ -268,10 +284,9 @@
           </a:lstStyle>
           <a:p>
             <a:r>
-              <a:rPr lang="zh-CN" altLang="en-US" smtClean="0"/>
+              <a:rPr lang="zh-CN" altLang="en-US"/>
               <a:t>单击此处编辑母版副标题样式</a:t>
             </a:r>
-            <a:endParaRPr lang="zh-CN" altLang="en-US"/>
           </a:p>
         </p:txBody>
       </p:sp>
@@ -292,7 +307,7 @@
           <a:p>
             <a:fld id="{530820CF-B880-4189-942D-D702A7CBA730}" type="datetimeFigureOut">
               <a:rPr lang="zh-CN" altLang="en-US" smtClean="0"/>
-              <a:t>2023/10/3</a:t>
+              <a:t>2024/5/30</a:t>
             </a:fld>
             <a:endParaRPr lang="zh-CN" altLang="en-US"/>
           </a:p>
@@ -381,10 +396,9 @@
           <a:lstStyle/>
           <a:p>
             <a:r>
-              <a:rPr lang="zh-CN" altLang="en-US" smtClean="0"/>
+              <a:rPr lang="zh-CN" altLang="en-US"/>
               <a:t>单击此处编辑母版标题样式</a:t>
             </a:r>
-            <a:endParaRPr lang="zh-CN" altLang="en-US"/>
           </a:p>
         </p:txBody>
       </p:sp>
@@ -405,38 +419,37 @@
           <a:p>
             <a:pPr lvl="0"/>
             <a:r>
-              <a:rPr lang="zh-CN" altLang="en-US" smtClean="0"/>
+              <a:rPr lang="zh-CN" altLang="en-US"/>
               <a:t>单击此处编辑母版文本样式</a:t>
             </a:r>
           </a:p>
           <a:p>
             <a:pPr lvl="1"/>
             <a:r>
-              <a:rPr lang="zh-CN" altLang="en-US" smtClean="0"/>
+              <a:rPr lang="zh-CN" altLang="en-US"/>
               <a:t>第二级</a:t>
             </a:r>
           </a:p>
           <a:p>
             <a:pPr lvl="2"/>
             <a:r>
-              <a:rPr lang="zh-CN" altLang="en-US" smtClean="0"/>
+              <a:rPr lang="zh-CN" altLang="en-US"/>
               <a:t>第三级</a:t>
             </a:r>
           </a:p>
           <a:p>
             <a:pPr lvl="3"/>
             <a:r>
-              <a:rPr lang="zh-CN" altLang="en-US" smtClean="0"/>
+              <a:rPr lang="zh-CN" altLang="en-US"/>
               <a:t>第四级</a:t>
             </a:r>
           </a:p>
           <a:p>
             <a:pPr lvl="4"/>
             <a:r>
-              <a:rPr lang="zh-CN" altLang="en-US" smtClean="0"/>
+              <a:rPr lang="zh-CN" altLang="en-US"/>
               <a:t>第五级</a:t>
             </a:r>
-            <a:endParaRPr lang="zh-CN" altLang="en-US"/>
           </a:p>
         </p:txBody>
       </p:sp>
@@ -457,7 +470,7 @@
           <a:p>
             <a:fld id="{530820CF-B880-4189-942D-D702A7CBA730}" type="datetimeFigureOut">
               <a:rPr lang="zh-CN" altLang="en-US" smtClean="0"/>
-              <a:t>2023/10/3</a:t>
+              <a:t>2024/5/30</a:t>
             </a:fld>
             <a:endParaRPr lang="zh-CN" altLang="en-US"/>
           </a:p>
@@ -551,10 +564,9 @@
           <a:lstStyle/>
           <a:p>
             <a:r>
-              <a:rPr lang="zh-CN" altLang="en-US" smtClean="0"/>
+              <a:rPr lang="zh-CN" altLang="en-US"/>
               <a:t>单击此处编辑母版标题样式</a:t>
             </a:r>
-            <a:endParaRPr lang="zh-CN" altLang="en-US"/>
           </a:p>
         </p:txBody>
       </p:sp>
@@ -580,38 +592,37 @@
           <a:p>
             <a:pPr lvl="0"/>
             <a:r>
-              <a:rPr lang="zh-CN" altLang="en-US" smtClean="0"/>
+              <a:rPr lang="zh-CN" altLang="en-US"/>
               <a:t>单击此处编辑母版文本样式</a:t>
             </a:r>
           </a:p>
           <a:p>
             <a:pPr lvl="1"/>
             <a:r>
-              <a:rPr lang="zh-CN" altLang="en-US" smtClean="0"/>
+              <a:rPr lang="zh-CN" altLang="en-US"/>
               <a:t>第二级</a:t>
             </a:r>
           </a:p>
           <a:p>
             <a:pPr lvl="2"/>
             <a:r>
-              <a:rPr lang="zh-CN" altLang="en-US" smtClean="0"/>
+              <a:rPr lang="zh-CN" altLang="en-US"/>
               <a:t>第三级</a:t>
             </a:r>
           </a:p>
           <a:p>
             <a:pPr lvl="3"/>
             <a:r>
-              <a:rPr lang="zh-CN" altLang="en-US" smtClean="0"/>
+              <a:rPr lang="zh-CN" altLang="en-US"/>
               <a:t>第四级</a:t>
             </a:r>
           </a:p>
           <a:p>
             <a:pPr lvl="4"/>
             <a:r>
-              <a:rPr lang="zh-CN" altLang="en-US" smtClean="0"/>
+              <a:rPr lang="zh-CN" altLang="en-US"/>
               <a:t>第五级</a:t>
             </a:r>
-            <a:endParaRPr lang="zh-CN" altLang="en-US"/>
           </a:p>
         </p:txBody>
       </p:sp>
@@ -632,7 +643,7 @@
           <a:p>
             <a:fld id="{530820CF-B880-4189-942D-D702A7CBA730}" type="datetimeFigureOut">
               <a:rPr lang="zh-CN" altLang="en-US" smtClean="0"/>
-              <a:t>2023/10/3</a:t>
+              <a:t>2024/5/30</a:t>
             </a:fld>
             <a:endParaRPr lang="zh-CN" altLang="en-US"/>
           </a:p>
@@ -721,10 +732,9 @@
           <a:lstStyle/>
           <a:p>
             <a:r>
-              <a:rPr lang="zh-CN" altLang="en-US" smtClean="0"/>
+              <a:rPr lang="zh-CN" altLang="en-US"/>
               <a:t>单击此处编辑母版标题样式</a:t>
             </a:r>
-            <a:endParaRPr lang="zh-CN" altLang="en-US"/>
           </a:p>
         </p:txBody>
       </p:sp>
@@ -745,38 +755,37 @@
           <a:p>
             <a:pPr lvl="0"/>
             <a:r>
-              <a:rPr lang="zh-CN" altLang="en-US" smtClean="0"/>
+              <a:rPr lang="zh-CN" altLang="en-US"/>
               <a:t>单击此处编辑母版文本样式</a:t>
             </a:r>
           </a:p>
           <a:p>
             <a:pPr lvl="1"/>
             <a:r>
-              <a:rPr lang="zh-CN" altLang="en-US" smtClean="0"/>
+              <a:rPr lang="zh-CN" altLang="en-US"/>
               <a:t>第二级</a:t>
             </a:r>
           </a:p>
           <a:p>
             <a:pPr lvl="2"/>
             <a:r>
-              <a:rPr lang="zh-CN" altLang="en-US" smtClean="0"/>
+              <a:rPr lang="zh-CN" altLang="en-US"/>
               <a:t>第三级</a:t>
             </a:r>
           </a:p>
           <a:p>
             <a:pPr lvl="3"/>
             <a:r>
-              <a:rPr lang="zh-CN" altLang="en-US" smtClean="0"/>
+              <a:rPr lang="zh-CN" altLang="en-US"/>
               <a:t>第四级</a:t>
             </a:r>
           </a:p>
           <a:p>
             <a:pPr lvl="4"/>
             <a:r>
-              <a:rPr lang="zh-CN" altLang="en-US" smtClean="0"/>
+              <a:rPr lang="zh-CN" altLang="en-US"/>
               <a:t>第五级</a:t>
             </a:r>
-            <a:endParaRPr lang="zh-CN" altLang="en-US"/>
           </a:p>
         </p:txBody>
       </p:sp>
@@ -797,7 +806,7 @@
           <a:p>
             <a:fld id="{530820CF-B880-4189-942D-D702A7CBA730}" type="datetimeFigureOut">
               <a:rPr lang="zh-CN" altLang="en-US" smtClean="0"/>
-              <a:t>2023/10/3</a:t>
+              <a:t>2024/5/30</a:t>
             </a:fld>
             <a:endParaRPr lang="zh-CN" altLang="en-US"/>
           </a:p>
@@ -895,10 +904,9 @@
           </a:lstStyle>
           <a:p>
             <a:r>
-              <a:rPr lang="zh-CN" altLang="en-US" smtClean="0"/>
+              <a:rPr lang="zh-CN" altLang="en-US"/>
               <a:t>单击此处编辑母版标题样式</a:t>
             </a:r>
-            <a:endParaRPr lang="zh-CN" altLang="en-US"/>
           </a:p>
         </p:txBody>
       </p:sp>
@@ -1015,7 +1023,7 @@
           <a:p>
             <a:pPr lvl="0"/>
             <a:r>
-              <a:rPr lang="zh-CN" altLang="en-US" smtClean="0"/>
+              <a:rPr lang="zh-CN" altLang="en-US"/>
               <a:t>单击此处编辑母版文本样式</a:t>
             </a:r>
           </a:p>
@@ -1038,7 +1046,7 @@
           <a:p>
             <a:fld id="{530820CF-B880-4189-942D-D702A7CBA730}" type="datetimeFigureOut">
               <a:rPr lang="zh-CN" altLang="en-US" smtClean="0"/>
-              <a:t>2023/10/3</a:t>
+              <a:t>2024/5/30</a:t>
             </a:fld>
             <a:endParaRPr lang="zh-CN" altLang="en-US"/>
           </a:p>
@@ -1127,10 +1135,9 @@
           <a:lstStyle/>
           <a:p>
             <a:r>
-              <a:rPr lang="zh-CN" altLang="en-US" smtClean="0"/>
+              <a:rPr lang="zh-CN" altLang="en-US"/>
               <a:t>单击此处编辑母版标题样式</a:t>
             </a:r>
-            <a:endParaRPr lang="zh-CN" altLang="en-US"/>
           </a:p>
         </p:txBody>
       </p:sp>
@@ -1184,38 +1191,37 @@
           <a:p>
             <a:pPr lvl="0"/>
             <a:r>
-              <a:rPr lang="zh-CN" altLang="en-US" smtClean="0"/>
+              <a:rPr lang="zh-CN" altLang="en-US"/>
               <a:t>单击此处编辑母版文本样式</a:t>
             </a:r>
           </a:p>
           <a:p>
             <a:pPr lvl="1"/>
             <a:r>
-              <a:rPr lang="zh-CN" altLang="en-US" smtClean="0"/>
+              <a:rPr lang="zh-CN" altLang="en-US"/>
               <a:t>第二级</a:t>
             </a:r>
           </a:p>
           <a:p>
             <a:pPr lvl="2"/>
             <a:r>
-              <a:rPr lang="zh-CN" altLang="en-US" smtClean="0"/>
+              <a:rPr lang="zh-CN" altLang="en-US"/>
               <a:t>第三级</a:t>
             </a:r>
           </a:p>
           <a:p>
             <a:pPr lvl="3"/>
             <a:r>
-              <a:rPr lang="zh-CN" altLang="en-US" smtClean="0"/>
+              <a:rPr lang="zh-CN" altLang="en-US"/>
               <a:t>第四级</a:t>
             </a:r>
           </a:p>
           <a:p>
             <a:pPr lvl="4"/>
             <a:r>
-              <a:rPr lang="zh-CN" altLang="en-US" smtClean="0"/>
+              <a:rPr lang="zh-CN" altLang="en-US"/>
               <a:t>第五级</a:t>
             </a:r>
-            <a:endParaRPr lang="zh-CN" altLang="en-US"/>
           </a:p>
         </p:txBody>
       </p:sp>
@@ -1269,38 +1275,37 @@
           <a:p>
             <a:pPr lvl="0"/>
             <a:r>
-              <a:rPr lang="zh-CN" altLang="en-US" smtClean="0"/>
+              <a:rPr lang="zh-CN" altLang="en-US"/>
               <a:t>单击此处编辑母版文本样式</a:t>
             </a:r>
           </a:p>
           <a:p>
             <a:pPr lvl="1"/>
             <a:r>
-              <a:rPr lang="zh-CN" altLang="en-US" smtClean="0"/>
+              <a:rPr lang="zh-CN" altLang="en-US"/>
               <a:t>第二级</a:t>
             </a:r>
           </a:p>
           <a:p>
             <a:pPr lvl="2"/>
             <a:r>
-              <a:rPr lang="zh-CN" altLang="en-US" smtClean="0"/>
+              <a:rPr lang="zh-CN" altLang="en-US"/>
               <a:t>第三级</a:t>
             </a:r>
           </a:p>
           <a:p>
             <a:pPr lvl="3"/>
             <a:r>
-              <a:rPr lang="zh-CN" altLang="en-US" smtClean="0"/>
+              <a:rPr lang="zh-CN" altLang="en-US"/>
               <a:t>第四级</a:t>
             </a:r>
           </a:p>
           <a:p>
             <a:pPr lvl="4"/>
             <a:r>
-              <a:rPr lang="zh-CN" altLang="en-US" smtClean="0"/>
+              <a:rPr lang="zh-CN" altLang="en-US"/>
               <a:t>第五级</a:t>
             </a:r>
-            <a:endParaRPr lang="zh-CN" altLang="en-US"/>
           </a:p>
         </p:txBody>
       </p:sp>
@@ -1321,7 +1326,7 @@
           <a:p>
             <a:fld id="{530820CF-B880-4189-942D-D702A7CBA730}" type="datetimeFigureOut">
               <a:rPr lang="zh-CN" altLang="en-US" smtClean="0"/>
-              <a:t>2023/10/3</a:t>
+              <a:t>2024/5/30</a:t>
             </a:fld>
             <a:endParaRPr lang="zh-CN" altLang="en-US"/>
           </a:p>
@@ -1414,10 +1419,9 @@
           </a:lstStyle>
           <a:p>
             <a:r>
-              <a:rPr lang="zh-CN" altLang="en-US" smtClean="0"/>
+              <a:rPr lang="zh-CN" altLang="en-US"/>
               <a:t>单击此处编辑母版标题样式</a:t>
             </a:r>
-            <a:endParaRPr lang="zh-CN" altLang="en-US"/>
           </a:p>
         </p:txBody>
       </p:sp>
@@ -1480,7 +1484,7 @@
           <a:p>
             <a:pPr lvl="0"/>
             <a:r>
-              <a:rPr lang="zh-CN" altLang="en-US" smtClean="0"/>
+              <a:rPr lang="zh-CN" altLang="en-US"/>
               <a:t>单击此处编辑母版文本样式</a:t>
             </a:r>
           </a:p>
@@ -1536,38 +1540,37 @@
           <a:p>
             <a:pPr lvl="0"/>
             <a:r>
-              <a:rPr lang="zh-CN" altLang="en-US" smtClean="0"/>
+              <a:rPr lang="zh-CN" altLang="en-US"/>
               <a:t>单击此处编辑母版文本样式</a:t>
             </a:r>
           </a:p>
           <a:p>
             <a:pPr lvl="1"/>
             <a:r>
-              <a:rPr lang="zh-CN" altLang="en-US" smtClean="0"/>
+              <a:rPr lang="zh-CN" altLang="en-US"/>
               <a:t>第二级</a:t>
             </a:r>
           </a:p>
           <a:p>
             <a:pPr lvl="2"/>
             <a:r>
-              <a:rPr lang="zh-CN" altLang="en-US" smtClean="0"/>
+              <a:rPr lang="zh-CN" altLang="en-US"/>
               <a:t>第三级</a:t>
             </a:r>
           </a:p>
           <a:p>
             <a:pPr lvl="3"/>
             <a:r>
-              <a:rPr lang="zh-CN" altLang="en-US" smtClean="0"/>
+              <a:rPr lang="zh-CN" altLang="en-US"/>
               <a:t>第四级</a:t>
             </a:r>
           </a:p>
           <a:p>
             <a:pPr lvl="4"/>
             <a:r>
-              <a:rPr lang="zh-CN" altLang="en-US" smtClean="0"/>
+              <a:rPr lang="zh-CN" altLang="en-US"/>
               <a:t>第五级</a:t>
             </a:r>
-            <a:endParaRPr lang="zh-CN" altLang="en-US"/>
           </a:p>
         </p:txBody>
       </p:sp>
@@ -1630,7 +1633,7 @@
           <a:p>
             <a:pPr lvl="0"/>
             <a:r>
-              <a:rPr lang="zh-CN" altLang="en-US" smtClean="0"/>
+              <a:rPr lang="zh-CN" altLang="en-US"/>
               <a:t>单击此处编辑母版文本样式</a:t>
             </a:r>
           </a:p>
@@ -1686,38 +1689,37 @@
           <a:p>
             <a:pPr lvl="0"/>
             <a:r>
-              <a:rPr lang="zh-CN" altLang="en-US" smtClean="0"/>
+              <a:rPr lang="zh-CN" altLang="en-US"/>
               <a:t>单击此处编辑母版文本样式</a:t>
             </a:r>
           </a:p>
           <a:p>
             <a:pPr lvl="1"/>
             <a:r>
-              <a:rPr lang="zh-CN" altLang="en-US" smtClean="0"/>
+              <a:rPr lang="zh-CN" altLang="en-US"/>
               <a:t>第二级</a:t>
             </a:r>
           </a:p>
           <a:p>
             <a:pPr lvl="2"/>
             <a:r>
-              <a:rPr lang="zh-CN" altLang="en-US" smtClean="0"/>
+              <a:rPr lang="zh-CN" altLang="en-US"/>
               <a:t>第三级</a:t>
             </a:r>
           </a:p>
           <a:p>
             <a:pPr lvl="3"/>
             <a:r>
-              <a:rPr lang="zh-CN" altLang="en-US" smtClean="0"/>
+              <a:rPr lang="zh-CN" altLang="en-US"/>
               <a:t>第四级</a:t>
             </a:r>
           </a:p>
           <a:p>
             <a:pPr lvl="4"/>
             <a:r>
-              <a:rPr lang="zh-CN" altLang="en-US" smtClean="0"/>
+              <a:rPr lang="zh-CN" altLang="en-US"/>
               <a:t>第五级</a:t>
             </a:r>
-            <a:endParaRPr lang="zh-CN" altLang="en-US"/>
           </a:p>
         </p:txBody>
       </p:sp>
@@ -1738,7 +1740,7 @@
           <a:p>
             <a:fld id="{530820CF-B880-4189-942D-D702A7CBA730}" type="datetimeFigureOut">
               <a:rPr lang="zh-CN" altLang="en-US" smtClean="0"/>
-              <a:t>2023/10/3</a:t>
+              <a:t>2024/5/30</a:t>
             </a:fld>
             <a:endParaRPr lang="zh-CN" altLang="en-US"/>
           </a:p>
@@ -1827,10 +1829,9 @@
           <a:lstStyle/>
           <a:p>
             <a:r>
-              <a:rPr lang="zh-CN" altLang="en-US" smtClean="0"/>
+              <a:rPr lang="zh-CN" altLang="en-US"/>
               <a:t>单击此处编辑母版标题样式</a:t>
             </a:r>
-            <a:endParaRPr lang="zh-CN" altLang="en-US"/>
           </a:p>
         </p:txBody>
       </p:sp>
@@ -1851,7 +1852,7 @@
           <a:p>
             <a:fld id="{530820CF-B880-4189-942D-D702A7CBA730}" type="datetimeFigureOut">
               <a:rPr lang="zh-CN" altLang="en-US" smtClean="0"/>
-              <a:t>2023/10/3</a:t>
+              <a:t>2024/5/30</a:t>
             </a:fld>
             <a:endParaRPr lang="zh-CN" altLang="en-US"/>
           </a:p>
@@ -1941,7 +1942,7 @@
           <a:p>
             <a:fld id="{530820CF-B880-4189-942D-D702A7CBA730}" type="datetimeFigureOut">
               <a:rPr lang="zh-CN" altLang="en-US" smtClean="0"/>
-              <a:t>2023/10/3</a:t>
+              <a:t>2024/5/30</a:t>
             </a:fld>
             <a:endParaRPr lang="zh-CN" altLang="en-US"/>
           </a:p>
@@ -2039,10 +2040,9 @@
           </a:lstStyle>
           <a:p>
             <a:r>
-              <a:rPr lang="zh-CN" altLang="en-US" smtClean="0"/>
+              <a:rPr lang="zh-CN" altLang="en-US"/>
               <a:t>单击此处编辑母版标题样式</a:t>
             </a:r>
-            <a:endParaRPr lang="zh-CN" altLang="en-US"/>
           </a:p>
         </p:txBody>
       </p:sp>
@@ -2096,38 +2096,37 @@
           <a:p>
             <a:pPr lvl="0"/>
             <a:r>
-              <a:rPr lang="zh-CN" altLang="en-US" smtClean="0"/>
+              <a:rPr lang="zh-CN" altLang="en-US"/>
               <a:t>单击此处编辑母版文本样式</a:t>
             </a:r>
           </a:p>
           <a:p>
             <a:pPr lvl="1"/>
             <a:r>
-              <a:rPr lang="zh-CN" altLang="en-US" smtClean="0"/>
+              <a:rPr lang="zh-CN" altLang="en-US"/>
               <a:t>第二级</a:t>
             </a:r>
           </a:p>
           <a:p>
             <a:pPr lvl="2"/>
             <a:r>
-              <a:rPr lang="zh-CN" altLang="en-US" smtClean="0"/>
+              <a:rPr lang="zh-CN" altLang="en-US"/>
               <a:t>第三级</a:t>
             </a:r>
           </a:p>
           <a:p>
             <a:pPr lvl="3"/>
             <a:r>
-              <a:rPr lang="zh-CN" altLang="en-US" smtClean="0"/>
+              <a:rPr lang="zh-CN" altLang="en-US"/>
               <a:t>第四级</a:t>
             </a:r>
           </a:p>
           <a:p>
             <a:pPr lvl="4"/>
             <a:r>
-              <a:rPr lang="zh-CN" altLang="en-US" smtClean="0"/>
+              <a:rPr lang="zh-CN" altLang="en-US"/>
               <a:t>第五级</a:t>
             </a:r>
-            <a:endParaRPr lang="zh-CN" altLang="en-US"/>
           </a:p>
         </p:txBody>
       </p:sp>
@@ -2190,7 +2189,7 @@
           <a:p>
             <a:pPr lvl="0"/>
             <a:r>
-              <a:rPr lang="zh-CN" altLang="en-US" smtClean="0"/>
+              <a:rPr lang="zh-CN" altLang="en-US"/>
               <a:t>单击此处编辑母版文本样式</a:t>
             </a:r>
           </a:p>
@@ -2213,7 +2212,7 @@
           <a:p>
             <a:fld id="{530820CF-B880-4189-942D-D702A7CBA730}" type="datetimeFigureOut">
               <a:rPr lang="zh-CN" altLang="en-US" smtClean="0"/>
-              <a:t>2023/10/3</a:t>
+              <a:t>2024/5/30</a:t>
             </a:fld>
             <a:endParaRPr lang="zh-CN" altLang="en-US"/>
           </a:p>
@@ -2311,10 +2310,9 @@
           </a:lstStyle>
           <a:p>
             <a:r>
-              <a:rPr lang="zh-CN" altLang="en-US" smtClean="0"/>
+              <a:rPr lang="zh-CN" altLang="en-US"/>
               <a:t>单击此处编辑母版标题样式</a:t>
             </a:r>
-            <a:endParaRPr lang="zh-CN" altLang="en-US"/>
           </a:p>
         </p:txBody>
       </p:sp>
@@ -2438,7 +2436,7 @@
           <a:p>
             <a:pPr lvl="0"/>
             <a:r>
-              <a:rPr lang="zh-CN" altLang="en-US" smtClean="0"/>
+              <a:rPr lang="zh-CN" altLang="en-US"/>
               <a:t>单击此处编辑母版文本样式</a:t>
             </a:r>
           </a:p>
@@ -2461,7 +2459,7 @@
           <a:p>
             <a:fld id="{530820CF-B880-4189-942D-D702A7CBA730}" type="datetimeFigureOut">
               <a:rPr lang="zh-CN" altLang="en-US" smtClean="0"/>
-              <a:t>2023/10/3</a:t>
+              <a:t>2024/5/30</a:t>
             </a:fld>
             <a:endParaRPr lang="zh-CN" altLang="en-US"/>
           </a:p>
@@ -2565,10 +2563,9 @@
           <a:lstStyle/>
           <a:p>
             <a:r>
-              <a:rPr lang="zh-CN" altLang="en-US" smtClean="0"/>
+              <a:rPr lang="zh-CN" altLang="en-US"/>
               <a:t>单击此处编辑母版标题样式</a:t>
             </a:r>
-            <a:endParaRPr lang="zh-CN" altLang="en-US"/>
           </a:p>
         </p:txBody>
       </p:sp>
@@ -2599,38 +2596,37 @@
           <a:p>
             <a:pPr lvl="0"/>
             <a:r>
-              <a:rPr lang="zh-CN" altLang="en-US" smtClean="0"/>
+              <a:rPr lang="zh-CN" altLang="en-US"/>
               <a:t>单击此处编辑母版文本样式</a:t>
             </a:r>
           </a:p>
           <a:p>
             <a:pPr lvl="1"/>
             <a:r>
-              <a:rPr lang="zh-CN" altLang="en-US" smtClean="0"/>
+              <a:rPr lang="zh-CN" altLang="en-US"/>
               <a:t>第二级</a:t>
             </a:r>
           </a:p>
           <a:p>
             <a:pPr lvl="2"/>
             <a:r>
-              <a:rPr lang="zh-CN" altLang="en-US" smtClean="0"/>
+              <a:rPr lang="zh-CN" altLang="en-US"/>
               <a:t>第三级</a:t>
             </a:r>
           </a:p>
           <a:p>
             <a:pPr lvl="3"/>
             <a:r>
-              <a:rPr lang="zh-CN" altLang="en-US" smtClean="0"/>
+              <a:rPr lang="zh-CN" altLang="en-US"/>
               <a:t>第四级</a:t>
             </a:r>
           </a:p>
           <a:p>
             <a:pPr lvl="4"/>
             <a:r>
-              <a:rPr lang="zh-CN" altLang="en-US" smtClean="0"/>
+              <a:rPr lang="zh-CN" altLang="en-US"/>
               <a:t>第五级</a:t>
             </a:r>
-            <a:endParaRPr lang="zh-CN" altLang="en-US"/>
           </a:p>
         </p:txBody>
       </p:sp>
@@ -2669,7 +2665,7 @@
           <a:p>
             <a:fld id="{530820CF-B880-4189-942D-D702A7CBA730}" type="datetimeFigureOut">
               <a:rPr lang="zh-CN" altLang="en-US" smtClean="0"/>
-              <a:t>2023/10/3</a:t>
+              <a:t>2024/5/30</a:t>
             </a:fld>
             <a:endParaRPr lang="zh-CN" altLang="en-US"/>
           </a:p>
@@ -3062,23 +3058,19 @@
           <a:lstStyle/>
           <a:p>
             <a:r>
-              <a:rPr lang="en-US" altLang="zh-CN" sz="1400" dirty="0" smtClean="0">
+              <a:rPr lang="en-US" altLang="zh-CN" sz="1400" dirty="0">
                 <a:latin typeface="微软雅黑" pitchFamily="34" charset="-122"/>
                 <a:ea typeface="微软雅黑" pitchFamily="34" charset="-122"/>
               </a:rPr>
               <a:t>TCP</a:t>
             </a:r>
             <a:r>
-              <a:rPr lang="zh-CN" altLang="en-US" sz="1400" dirty="0" smtClean="0">
+              <a:rPr lang="zh-CN" altLang="en-US" sz="1400" dirty="0">
                 <a:latin typeface="微软雅黑" pitchFamily="34" charset="-122"/>
                 <a:ea typeface="微软雅黑" pitchFamily="34" charset="-122"/>
               </a:rPr>
               <a:t>建立连接，三次握手</a:t>
             </a:r>
-            <a:endParaRPr lang="zh-CN" altLang="en-US" sz="1400" dirty="0">
-              <a:latin typeface="微软雅黑" pitchFamily="34" charset="-122"/>
-              <a:ea typeface="微软雅黑" pitchFamily="34" charset="-122"/>
-            </a:endParaRPr>
           </a:p>
         </p:txBody>
       </p:sp>
@@ -3169,142 +3161,135 @@
           <a:lstStyle/>
           <a:p>
             <a:r>
-              <a:rPr lang="en-US" altLang="zh-CN" sz="1400" dirty="0" smtClean="0">
+              <a:rPr lang="en-US" altLang="zh-CN" sz="1400" dirty="0">
                 <a:latin typeface="微软雅黑" pitchFamily="34" charset="-122"/>
                 <a:ea typeface="微软雅黑" pitchFamily="34" charset="-122"/>
               </a:rPr>
               <a:t>SYN : </a:t>
             </a:r>
             <a:r>
-              <a:rPr lang="zh-CN" altLang="en-US" sz="1400" dirty="0" smtClean="0">
+              <a:rPr lang="zh-CN" altLang="en-US" sz="1400" dirty="0">
                 <a:latin typeface="微软雅黑" pitchFamily="34" charset="-122"/>
                 <a:ea typeface="微软雅黑" pitchFamily="34" charset="-122"/>
               </a:rPr>
               <a:t>请求同步</a:t>
             </a:r>
-            <a:endParaRPr lang="en-US" altLang="zh-CN" sz="1400" dirty="0" smtClean="0">
+            <a:endParaRPr lang="en-US" altLang="zh-CN" sz="1400" dirty="0">
               <a:latin typeface="微软雅黑" pitchFamily="34" charset="-122"/>
               <a:ea typeface="微软雅黑" pitchFamily="34" charset="-122"/>
             </a:endParaRPr>
           </a:p>
           <a:p>
             <a:r>
-              <a:rPr lang="en-US" altLang="zh-CN" sz="1400" dirty="0" smtClean="0">
+              <a:rPr lang="en-US" altLang="zh-CN" sz="1400" dirty="0">
                 <a:latin typeface="微软雅黑" pitchFamily="34" charset="-122"/>
                 <a:ea typeface="微软雅黑" pitchFamily="34" charset="-122"/>
               </a:rPr>
               <a:t>ACK :  </a:t>
             </a:r>
             <a:r>
-              <a:rPr lang="zh-CN" altLang="en-US" sz="1400" dirty="0" smtClean="0">
+              <a:rPr lang="zh-CN" altLang="en-US" sz="1400" dirty="0">
                 <a:latin typeface="微软雅黑" pitchFamily="34" charset="-122"/>
                 <a:ea typeface="微软雅黑" pitchFamily="34" charset="-122"/>
               </a:rPr>
               <a:t>确认同步</a:t>
             </a:r>
-            <a:endParaRPr lang="en-US" altLang="zh-CN" sz="1400" dirty="0" smtClean="0">
+            <a:endParaRPr lang="en-US" altLang="zh-CN" sz="1400" dirty="0">
               <a:latin typeface="微软雅黑" pitchFamily="34" charset="-122"/>
               <a:ea typeface="微软雅黑" pitchFamily="34" charset="-122"/>
             </a:endParaRPr>
           </a:p>
           <a:p>
             <a:r>
-              <a:rPr lang="zh-CN" altLang="en-US" sz="1400" dirty="0" smtClean="0">
+              <a:rPr lang="zh-CN" altLang="en-US" sz="1400" dirty="0">
                 <a:latin typeface="微软雅黑" pitchFamily="34" charset="-122"/>
                 <a:ea typeface="微软雅黑" pitchFamily="34" charset="-122"/>
               </a:rPr>
               <a:t>注意这里小写的</a:t>
             </a:r>
             <a:r>
-              <a:rPr lang="en-US" altLang="zh-CN" sz="1400" dirty="0" err="1" smtClean="0">
+              <a:rPr lang="en-US" altLang="zh-CN" sz="1400" dirty="0" err="1">
                 <a:latin typeface="微软雅黑" pitchFamily="34" charset="-122"/>
                 <a:ea typeface="微软雅黑" pitchFamily="34" charset="-122"/>
               </a:rPr>
               <a:t>ack</a:t>
             </a:r>
             <a:r>
-              <a:rPr lang="zh-CN" altLang="en-US" sz="1400" dirty="0" smtClean="0">
+              <a:rPr lang="zh-CN" altLang="en-US" sz="1400" dirty="0">
                 <a:latin typeface="微软雅黑" pitchFamily="34" charset="-122"/>
                 <a:ea typeface="微软雅黑" pitchFamily="34" charset="-122"/>
               </a:rPr>
               <a:t>实际是</a:t>
             </a:r>
             <a:r>
-              <a:rPr lang="en-US" altLang="zh-CN" sz="1400" dirty="0" err="1" smtClean="0">
+              <a:rPr lang="en-US" altLang="zh-CN" sz="1400" dirty="0" err="1">
                 <a:latin typeface="微软雅黑" pitchFamily="34" charset="-122"/>
                 <a:ea typeface="微软雅黑" pitchFamily="34" charset="-122"/>
               </a:rPr>
               <a:t>ack_seq</a:t>
             </a:r>
             <a:r>
-              <a:rPr lang="en-US" altLang="zh-CN" sz="1400" dirty="0" smtClean="0">
+              <a:rPr lang="en-US" altLang="zh-CN" sz="1400" dirty="0">
                 <a:latin typeface="微软雅黑" pitchFamily="34" charset="-122"/>
                 <a:ea typeface="微软雅黑" pitchFamily="34" charset="-122"/>
               </a:rPr>
               <a:t>(</a:t>
             </a:r>
             <a:r>
-              <a:rPr lang="en-US" altLang="zh-CN" sz="1400" dirty="0" err="1" smtClean="0">
+              <a:rPr lang="en-US" altLang="zh-CN" sz="1400" dirty="0" err="1">
                 <a:latin typeface="微软雅黑" pitchFamily="34" charset="-122"/>
                 <a:ea typeface="微软雅黑" pitchFamily="34" charset="-122"/>
               </a:rPr>
               <a:t>Wireshark</a:t>
             </a:r>
             <a:r>
-              <a:rPr lang="zh-CN" altLang="en-US" sz="1400" dirty="0" smtClean="0">
+              <a:rPr lang="zh-CN" altLang="en-US" sz="1400" dirty="0">
                 <a:latin typeface="微软雅黑" pitchFamily="34" charset="-122"/>
                 <a:ea typeface="微软雅黑" pitchFamily="34" charset="-122"/>
               </a:rPr>
               <a:t>中用</a:t>
             </a:r>
             <a:r>
-              <a:rPr lang="en-US" altLang="zh-CN" sz="1400" dirty="0" smtClean="0">
+              <a:rPr lang="en-US" altLang="zh-CN" sz="1400" dirty="0">
                 <a:latin typeface="微软雅黑" pitchFamily="34" charset="-122"/>
                 <a:ea typeface="微软雅黑" pitchFamily="34" charset="-122"/>
               </a:rPr>
               <a:t>Acknowledgement number (raw)</a:t>
             </a:r>
             <a:r>
-              <a:rPr lang="zh-CN" altLang="en-US" sz="1400" dirty="0" smtClean="0">
+              <a:rPr lang="zh-CN" altLang="en-US" sz="1400" dirty="0">
                 <a:latin typeface="微软雅黑" pitchFamily="34" charset="-122"/>
                 <a:ea typeface="微软雅黑" pitchFamily="34" charset="-122"/>
               </a:rPr>
               <a:t>表示</a:t>
             </a:r>
             <a:r>
-              <a:rPr lang="en-US" altLang="zh-CN" sz="1400" dirty="0" smtClean="0">
+              <a:rPr lang="en-US" altLang="zh-CN" sz="1400" dirty="0">
                 <a:latin typeface="微软雅黑" pitchFamily="34" charset="-122"/>
                 <a:ea typeface="微软雅黑" pitchFamily="34" charset="-122"/>
               </a:rPr>
               <a:t>) </a:t>
             </a:r>
             <a:r>
-              <a:rPr lang="zh-CN" altLang="en-US" sz="1400" dirty="0" smtClean="0">
+              <a:rPr lang="zh-CN" altLang="en-US" sz="1400" dirty="0">
                 <a:latin typeface="微软雅黑" pitchFamily="34" charset="-122"/>
                 <a:ea typeface="微软雅黑" pitchFamily="34" charset="-122"/>
               </a:rPr>
               <a:t>和大写的</a:t>
             </a:r>
             <a:r>
-              <a:rPr lang="en-US" altLang="zh-CN" sz="1400" dirty="0" smtClean="0">
+              <a:rPr lang="en-US" altLang="zh-CN" sz="1400" dirty="0">
                 <a:latin typeface="微软雅黑" pitchFamily="34" charset="-122"/>
                 <a:ea typeface="微软雅黑" pitchFamily="34" charset="-122"/>
               </a:rPr>
               <a:t>ACK</a:t>
             </a:r>
             <a:r>
-              <a:rPr lang="zh-CN" altLang="en-US" sz="1400" dirty="0" smtClean="0">
-                <a:latin typeface="微软雅黑" pitchFamily="34" charset="-122"/>
-                <a:ea typeface="微软雅黑" pitchFamily="34" charset="-122"/>
-              </a:rPr>
-              <a:t>不是一回事</a:t>
-            </a:r>
-            <a:r>
               <a:rPr lang="zh-CN" altLang="en-US" sz="1400" dirty="0">
                 <a:latin typeface="微软雅黑" pitchFamily="34" charset="-122"/>
                 <a:ea typeface="微软雅黑" pitchFamily="34" charset="-122"/>
               </a:rPr>
-              <a:t>。</a:t>
+              <a:t>不是一回事。</a:t>
             </a:r>
           </a:p>
         </p:txBody>
@@ -3339,6 +3324,122 @@
           <a:chExt cx="0" cy="0"/>
         </a:xfrm>
       </p:grpSpPr>
+      <p:pic>
+        <p:nvPicPr>
+          <p:cNvPr id="6" name="图片 5">
+            <a:extLst>
+              <a:ext uri="{FF2B5EF4-FFF2-40B4-BE49-F238E27FC236}">
+                <a16:creationId xmlns:a16="http://schemas.microsoft.com/office/drawing/2014/main" id="{20B8957A-1C33-3EE8-241A-FF5FDFE8DC91}"/>
+              </a:ext>
+            </a:extLst>
+          </p:cNvPr>
+          <p:cNvPicPr>
+            <a:picLocks noChangeAspect="1"/>
+          </p:cNvPicPr>
+          <p:nvPr/>
+        </p:nvPicPr>
+        <p:blipFill>
+          <a:blip r:embed="rId2"/>
+          <a:stretch>
+            <a:fillRect/>
+          </a:stretch>
+        </p:blipFill>
+        <p:spPr>
+          <a:xfrm>
+            <a:off x="107504" y="1196752"/>
+            <a:ext cx="7128792" cy="3496286"/>
+          </a:xfrm>
+          <a:prstGeom prst="rect">
+            <a:avLst/>
+          </a:prstGeom>
+        </p:spPr>
+      </p:pic>
+      <p:sp>
+        <p:nvSpPr>
+          <p:cNvPr id="2" name="文本框 1">
+            <a:extLst>
+              <a:ext uri="{FF2B5EF4-FFF2-40B4-BE49-F238E27FC236}">
+                <a16:creationId xmlns:a16="http://schemas.microsoft.com/office/drawing/2014/main" id="{42E9E434-8B9F-1826-1EE5-87ABAC061D39}"/>
+              </a:ext>
+            </a:extLst>
+          </p:cNvPr>
+          <p:cNvSpPr txBox="1"/>
+          <p:nvPr/>
+        </p:nvSpPr>
+        <p:spPr>
+          <a:xfrm>
+            <a:off x="539552" y="332656"/>
+            <a:ext cx="5400600" cy="369332"/>
+          </a:xfrm>
+          <a:prstGeom prst="rect">
+            <a:avLst/>
+          </a:prstGeom>
+          <a:noFill/>
+        </p:spPr>
+        <p:txBody>
+          <a:bodyPr wrap="square" rtlCol="0">
+            <a:spAutoFit/>
+          </a:bodyPr>
+          <a:lstStyle/>
+          <a:p>
+            <a:r>
+              <a:rPr lang="zh-CN" altLang="en-US" dirty="0"/>
+              <a:t>使用</a:t>
+            </a:r>
+            <a:r>
+              <a:rPr lang="en-US" altLang="zh-CN" dirty="0"/>
+              <a:t>SSH</a:t>
+            </a:r>
+            <a:r>
+              <a:rPr lang="zh-CN" altLang="en-US" dirty="0"/>
+              <a:t>链接虚拟机分析</a:t>
+            </a:r>
+            <a:r>
+              <a:rPr lang="en-US" altLang="zh-CN" dirty="0"/>
+              <a:t>TCP</a:t>
+            </a:r>
+            <a:r>
+              <a:rPr lang="zh-CN" altLang="en-US" dirty="0"/>
+              <a:t>协议时注意选择</a:t>
+            </a:r>
+            <a:r>
+              <a:rPr lang="en-US" altLang="zh-CN" dirty="0"/>
+              <a:t>vmnet8</a:t>
+            </a:r>
+            <a:endParaRPr lang="zh-CN" altLang="en-US" dirty="0"/>
+          </a:p>
+        </p:txBody>
+      </p:sp>
+    </p:spTree>
+    <p:extLst>
+      <p:ext uri="{BB962C8B-B14F-4D97-AF65-F5344CB8AC3E}">
+        <p14:creationId xmlns:p14="http://schemas.microsoft.com/office/powerpoint/2010/main" val="1014574699"/>
+      </p:ext>
+    </p:extLst>
+  </p:cSld>
+  <p:clrMapOvr>
+    <a:masterClrMapping/>
+  </p:clrMapOvr>
+</p:sld>
+</file>
+
+<file path=ppt/slides/slide3.xml><?xml version="1.0" encoding="utf-8"?>
+<p:sld xmlns:a="http://schemas.openxmlformats.org/drawingml/2006/main" xmlns:r="http://schemas.openxmlformats.org/officeDocument/2006/relationships" xmlns:p="http://schemas.openxmlformats.org/presentationml/2006/main">
+  <p:cSld>
+    <p:spTree>
+      <p:nvGrpSpPr>
+        <p:cNvPr id="1" name=""/>
+        <p:cNvGrpSpPr/>
+        <p:nvPr/>
+      </p:nvGrpSpPr>
+      <p:grpSpPr>
+        <a:xfrm>
+          <a:off x="0" y="0"/>
+          <a:ext cx="0" cy="0"/>
+          <a:chOff x="0" y="0"/>
+          <a:chExt cx="0" cy="0"/>
+        </a:xfrm>
+      </p:grpSpPr>
       <p:sp>
         <p:nvSpPr>
           <p:cNvPr id="2" name="TextBox 1"/>
@@ -3362,106 +3463,95 @@
           <a:lstStyle/>
           <a:p>
             <a:r>
-              <a:rPr lang="zh-CN" altLang="en-US" sz="1400" dirty="0" smtClean="0">
+              <a:rPr lang="zh-CN" altLang="en-US" sz="1400" dirty="0">
                 <a:latin typeface="微软雅黑" pitchFamily="34" charset="-122"/>
                 <a:ea typeface="微软雅黑" pitchFamily="34" charset="-122"/>
               </a:rPr>
               <a:t>第一次握手</a:t>
             </a:r>
             <a:r>
-              <a:rPr lang="en-US" altLang="zh-CN" sz="1400" dirty="0" smtClean="0">
+              <a:rPr lang="en-US" altLang="zh-CN" sz="1400" dirty="0">
                 <a:latin typeface="微软雅黑" pitchFamily="34" charset="-122"/>
                 <a:ea typeface="微软雅黑" pitchFamily="34" charset="-122"/>
                 <a:sym typeface="Wingdings" pitchFamily="2" charset="2"/>
               </a:rPr>
               <a:t>: </a:t>
             </a:r>
-            <a:endParaRPr lang="en-US" altLang="zh-CN" sz="1400" dirty="0" smtClean="0">
+            <a:endParaRPr lang="en-US" altLang="zh-CN" sz="1400" dirty="0">
               <a:latin typeface="微软雅黑" pitchFamily="34" charset="-122"/>
               <a:ea typeface="微软雅黑" pitchFamily="34" charset="-122"/>
             </a:endParaRPr>
           </a:p>
           <a:p>
             <a:r>
-              <a:rPr lang="zh-CN" altLang="en-US" sz="1400" dirty="0" smtClean="0">
+              <a:rPr lang="zh-CN" altLang="en-US" sz="1400" dirty="0">
                 <a:latin typeface="微软雅黑" pitchFamily="34" charset="-122"/>
                 <a:ea typeface="微软雅黑" pitchFamily="34" charset="-122"/>
               </a:rPr>
               <a:t>客户端发送建立连接请求，此时请求数据中</a:t>
             </a:r>
             <a:r>
-              <a:rPr lang="en-US" altLang="zh-CN" sz="1400" dirty="0" smtClean="0">
+              <a:rPr lang="en-US" altLang="zh-CN" sz="1400" dirty="0">
                 <a:latin typeface="微软雅黑" pitchFamily="34" charset="-122"/>
                 <a:ea typeface="微软雅黑" pitchFamily="34" charset="-122"/>
               </a:rPr>
               <a:t>SYN=1</a:t>
             </a:r>
             <a:r>
-              <a:rPr lang="zh-CN" altLang="en-US" sz="1400" dirty="0" smtClean="0">
+              <a:rPr lang="zh-CN" altLang="en-US" sz="1400" dirty="0">
                 <a:latin typeface="微软雅黑" pitchFamily="34" charset="-122"/>
                 <a:ea typeface="微软雅黑" pitchFamily="34" charset="-122"/>
               </a:rPr>
               <a:t>，</a:t>
             </a:r>
             <a:r>
-              <a:rPr lang="en-US" altLang="zh-CN" sz="1400" dirty="0" err="1" smtClean="0">
+              <a:rPr lang="en-US" altLang="zh-CN" sz="1400" dirty="0" err="1">
                 <a:latin typeface="微软雅黑" pitchFamily="34" charset="-122"/>
                 <a:ea typeface="微软雅黑" pitchFamily="34" charset="-122"/>
               </a:rPr>
               <a:t>seq</a:t>
             </a:r>
             <a:r>
-              <a:rPr lang="en-US" altLang="zh-CN" sz="1400" dirty="0" smtClean="0">
+              <a:rPr lang="en-US" altLang="zh-CN" sz="1400" dirty="0">
                 <a:latin typeface="微软雅黑" pitchFamily="34" charset="-122"/>
                 <a:ea typeface="微软雅黑" pitchFamily="34" charset="-122"/>
               </a:rPr>
               <a:t>=2422502077 (</a:t>
             </a:r>
             <a:r>
-              <a:rPr lang="zh-CN" altLang="en-US" sz="1400" dirty="0" smtClean="0">
+              <a:rPr lang="zh-CN" altLang="en-US" sz="1400" dirty="0">
                 <a:latin typeface="微软雅黑" pitchFamily="34" charset="-122"/>
                 <a:ea typeface="微软雅黑" pitchFamily="34" charset="-122"/>
               </a:rPr>
               <a:t>随机号码</a:t>
             </a:r>
             <a:r>
-              <a:rPr lang="en-US" altLang="zh-CN" sz="1400" dirty="0" smtClean="0">
+              <a:rPr lang="en-US" altLang="zh-CN" sz="1400" dirty="0">
                 <a:latin typeface="微软雅黑" pitchFamily="34" charset="-122"/>
                 <a:ea typeface="微软雅黑" pitchFamily="34" charset="-122"/>
               </a:rPr>
               <a:t>)</a:t>
             </a:r>
             <a:r>
-              <a:rPr lang="zh-CN" altLang="en-US" sz="1400" dirty="0" smtClean="0">
+              <a:rPr lang="zh-CN" altLang="en-US" sz="1400" dirty="0">
                 <a:latin typeface="微软雅黑" pitchFamily="34" charset="-122"/>
                 <a:ea typeface="微软雅黑" pitchFamily="34" charset="-122"/>
               </a:rPr>
               <a:t>。</a:t>
             </a:r>
-            <a:endParaRPr lang="en-US" altLang="zh-CN" sz="1400" dirty="0" smtClean="0">
+            <a:endParaRPr lang="en-US" altLang="zh-CN" sz="1400" dirty="0">
               <a:latin typeface="微软雅黑" pitchFamily="34" charset="-122"/>
               <a:ea typeface="微软雅黑" pitchFamily="34" charset="-122"/>
             </a:endParaRPr>
           </a:p>
           <a:p>
             <a:r>
-              <a:rPr lang="zh-CN" altLang="en-US" sz="1400" dirty="0" smtClean="0">
-                <a:latin typeface="微软雅黑" pitchFamily="34" charset="-122"/>
-                <a:ea typeface="微软雅黑" pitchFamily="34" charset="-122"/>
-              </a:rPr>
-              <a:t>第一次握手</a:t>
-            </a:r>
-            <a:r>
-              <a:rPr lang="zh-CN" altLang="en-US" sz="1400" dirty="0" smtClean="0">
-                <a:latin typeface="微软雅黑" pitchFamily="34" charset="-122"/>
-                <a:ea typeface="微软雅黑" pitchFamily="34" charset="-122"/>
-              </a:rPr>
-              <a:t>目的是证明客户端能发数据。</a:t>
-            </a:r>
-            <a:endParaRPr lang="zh-CN" altLang="en-US" sz="1400" dirty="0">
-              <a:latin typeface="微软雅黑" pitchFamily="34" charset="-122"/>
-              <a:ea typeface="微软雅黑" pitchFamily="34" charset="-122"/>
-            </a:endParaRPr>
+              <a:rPr lang="zh-CN" altLang="en-US" sz="1400" dirty="0">
+                <a:latin typeface="微软雅黑" pitchFamily="34" charset="-122"/>
+                <a:ea typeface="微软雅黑" pitchFamily="34" charset="-122"/>
+              </a:rPr>
+              <a:t>第一次握手目的是证明客户端能发数据。</a:t>
+            </a:r>
           </a:p>
         </p:txBody>
       </p:sp>
@@ -3542,7 +3632,7 @@
 </p:sld>
 </file>
 
-<file path=ppt/slides/slide3.xml><?xml version="1.0" encoding="utf-8"?>
+<file path=ppt/slides/slide4.xml><?xml version="1.0" encoding="utf-8"?>
 <p:sld xmlns:a="http://schemas.openxmlformats.org/drawingml/2006/main" xmlns:r="http://schemas.openxmlformats.org/officeDocument/2006/relationships" xmlns:p="http://schemas.openxmlformats.org/presentationml/2006/main">
   <p:cSld>
     <p:spTree>
@@ -3582,13 +3672,13 @@
           <a:lstStyle/>
           <a:p>
             <a:r>
-              <a:rPr lang="zh-CN" altLang="en-US" sz="1400" dirty="0" smtClean="0">
+              <a:rPr lang="zh-CN" altLang="en-US" sz="1400" dirty="0">
                 <a:latin typeface="微软雅黑" pitchFamily="34" charset="-122"/>
                 <a:ea typeface="微软雅黑" pitchFamily="34" charset="-122"/>
               </a:rPr>
               <a:t>第二次握手：为了证明服务端能收能发</a:t>
             </a:r>
-            <a:endParaRPr lang="en-US" altLang="zh-CN" sz="1400" dirty="0" smtClean="0">
+            <a:endParaRPr lang="en-US" altLang="zh-CN" sz="1400" dirty="0">
               <a:latin typeface="微软雅黑" pitchFamily="34" charset="-122"/>
               <a:ea typeface="微软雅黑" pitchFamily="34" charset="-122"/>
             </a:endParaRPr>
@@ -3599,108 +3689,87 @@
                 <a:latin typeface="微软雅黑" pitchFamily="34" charset="-122"/>
                 <a:ea typeface="微软雅黑" pitchFamily="34" charset="-122"/>
               </a:rPr>
-              <a:t>服务</a:t>
-            </a:r>
-            <a:r>
-              <a:rPr lang="zh-CN" altLang="en-US" sz="1400" dirty="0" smtClean="0">
-                <a:latin typeface="微软雅黑" pitchFamily="34" charset="-122"/>
-                <a:ea typeface="微软雅黑" pitchFamily="34" charset="-122"/>
-              </a:rPr>
-              <a:t>端发送确认信息</a:t>
-            </a:r>
-            <a:endParaRPr lang="en-US" altLang="zh-CN" sz="1400" dirty="0" smtClean="0">
+              <a:t>服务端发送确认信息</a:t>
+            </a:r>
+            <a:endParaRPr lang="en-US" altLang="zh-CN" sz="1400" dirty="0">
               <a:latin typeface="微软雅黑" pitchFamily="34" charset="-122"/>
               <a:ea typeface="微软雅黑" pitchFamily="34" charset="-122"/>
             </a:endParaRPr>
           </a:p>
           <a:p>
             <a:r>
-              <a:rPr lang="en-US" altLang="zh-CN" sz="1400" dirty="0" smtClean="0">
+              <a:rPr lang="en-US" altLang="zh-CN" sz="1400" dirty="0">
                 <a:latin typeface="微软雅黑" pitchFamily="34" charset="-122"/>
                 <a:ea typeface="微软雅黑" pitchFamily="34" charset="-122"/>
               </a:rPr>
               <a:t>SYN=1</a:t>
             </a:r>
             <a:r>
-              <a:rPr lang="zh-CN" altLang="en-US" sz="1400" dirty="0" smtClean="0">
+              <a:rPr lang="zh-CN" altLang="en-US" sz="1400" dirty="0">
                 <a:latin typeface="微软雅黑" pitchFamily="34" charset="-122"/>
                 <a:ea typeface="微软雅黑" pitchFamily="34" charset="-122"/>
               </a:rPr>
               <a:t>，</a:t>
             </a:r>
             <a:r>
-              <a:rPr lang="en-US" altLang="zh-CN" sz="1400" dirty="0" smtClean="0">
+              <a:rPr lang="en-US" altLang="zh-CN" sz="1400" dirty="0">
                 <a:latin typeface="微软雅黑" pitchFamily="34" charset="-122"/>
                 <a:ea typeface="微软雅黑" pitchFamily="34" charset="-122"/>
               </a:rPr>
               <a:t>ACK=1</a:t>
             </a:r>
             <a:r>
-              <a:rPr lang="zh-CN" altLang="en-US" sz="1400" dirty="0" smtClean="0">
+              <a:rPr lang="zh-CN" altLang="en-US" sz="1400" dirty="0">
                 <a:latin typeface="微软雅黑" pitchFamily="34" charset="-122"/>
                 <a:ea typeface="微软雅黑" pitchFamily="34" charset="-122"/>
               </a:rPr>
               <a:t>，</a:t>
             </a:r>
-            <a:endParaRPr lang="en-US" altLang="zh-CN" sz="1400" dirty="0" smtClean="0">
+            <a:endParaRPr lang="en-US" altLang="zh-CN" sz="1400" dirty="0">
               <a:latin typeface="微软雅黑" pitchFamily="34" charset="-122"/>
               <a:ea typeface="微软雅黑" pitchFamily="34" charset="-122"/>
             </a:endParaRPr>
           </a:p>
           <a:p>
             <a:r>
-              <a:rPr lang="en-US" altLang="zh-CN" sz="1400" dirty="0" err="1" smtClean="0">
+              <a:rPr lang="en-US" altLang="zh-CN" sz="1400" dirty="0" err="1">
                 <a:latin typeface="微软雅黑" pitchFamily="34" charset="-122"/>
                 <a:ea typeface="微软雅黑" pitchFamily="34" charset="-122"/>
               </a:rPr>
               <a:t>ack_seq</a:t>
             </a:r>
             <a:r>
-              <a:rPr lang="en-US" altLang="zh-CN" sz="1400" dirty="0" smtClean="0">
+              <a:rPr lang="en-US" altLang="zh-CN" sz="1400" dirty="0">
                 <a:latin typeface="微软雅黑" pitchFamily="34" charset="-122"/>
                 <a:ea typeface="微软雅黑" pitchFamily="34" charset="-122"/>
               </a:rPr>
               <a:t>=2422502078=2422502077 + 1(</a:t>
             </a:r>
             <a:r>
-              <a:rPr lang="zh-CN" altLang="en-US" sz="1400" dirty="0" smtClean="0">
+              <a:rPr lang="zh-CN" altLang="en-US" sz="1400" dirty="0">
                 <a:latin typeface="微软雅黑" pitchFamily="34" charset="-122"/>
                 <a:ea typeface="微软雅黑" pitchFamily="34" charset="-122"/>
               </a:rPr>
               <a:t>下图</a:t>
             </a:r>
             <a:r>
-              <a:rPr lang="en-US" altLang="zh-CN" sz="1400" dirty="0" smtClean="0">
-                <a:latin typeface="微软雅黑" pitchFamily="34" charset="-122"/>
-                <a:ea typeface="微软雅黑" pitchFamily="34" charset="-122"/>
-              </a:rPr>
-              <a:t>Acknowledgement </a:t>
-            </a:r>
-            <a:r>
               <a:rPr lang="en-US" altLang="zh-CN" sz="1400" dirty="0">
                 <a:latin typeface="微软雅黑" pitchFamily="34" charset="-122"/>
                 <a:ea typeface="微软雅黑" pitchFamily="34" charset="-122"/>
               </a:rPr>
-              <a:t>number (raw</a:t>
-            </a:r>
-            <a:r>
-              <a:rPr lang="en-US" altLang="zh-CN" sz="1400" dirty="0" smtClean="0">
-                <a:latin typeface="微软雅黑" pitchFamily="34" charset="-122"/>
-                <a:ea typeface="微软雅黑" pitchFamily="34" charset="-122"/>
-              </a:rPr>
-              <a:t>)</a:t>
-            </a:r>
-          </a:p>
-          <a:p>
-            <a:r>
-              <a:rPr lang="en-US" altLang="zh-CN" sz="1400" dirty="0" err="1" smtClean="0">
+              <a:t>Acknowledgement number (raw)</a:t>
+            </a:r>
+          </a:p>
+          <a:p>
+            <a:r>
+              <a:rPr lang="en-US" altLang="zh-CN" sz="1400" dirty="0" err="1">
                 <a:latin typeface="微软雅黑" pitchFamily="34" charset="-122"/>
                 <a:ea typeface="微软雅黑" pitchFamily="34" charset="-122"/>
               </a:rPr>
               <a:t>seq</a:t>
             </a:r>
             <a:r>
-              <a:rPr lang="en-US" altLang="zh-CN" sz="1400" dirty="0" smtClean="0">
+              <a:rPr lang="en-US" altLang="zh-CN" sz="1400" dirty="0">
                 <a:latin typeface="微软雅黑" pitchFamily="34" charset="-122"/>
                 <a:ea typeface="微软雅黑" pitchFamily="34" charset="-122"/>
               </a:rPr>
@@ -3790,7 +3859,7 @@
 </p:sld>
 </file>
 
-<file path=ppt/slides/slide4.xml><?xml version="1.0" encoding="utf-8"?>
+<file path=ppt/slides/slide5.xml><?xml version="1.0" encoding="utf-8"?>
 <p:sld xmlns:a="http://schemas.openxmlformats.org/drawingml/2006/main" xmlns:r="http://schemas.openxmlformats.org/officeDocument/2006/relationships" xmlns:p="http://schemas.openxmlformats.org/presentationml/2006/main">
   <p:cSld>
     <p:spTree>
@@ -3894,107 +3963,93 @@
           <a:lstStyle/>
           <a:p>
             <a:r>
-              <a:rPr lang="zh-CN" altLang="en-US" sz="1400" dirty="0" smtClean="0">
+              <a:rPr lang="zh-CN" altLang="en-US" sz="1400" dirty="0">
                 <a:latin typeface="微软雅黑" pitchFamily="34" charset="-122"/>
                 <a:ea typeface="微软雅黑" pitchFamily="34" charset="-122"/>
               </a:rPr>
               <a:t>第三次握手：为了证明客户端能收数据</a:t>
             </a:r>
-            <a:endParaRPr lang="en-US" altLang="zh-CN" sz="1400" dirty="0" smtClean="0">
+            <a:endParaRPr lang="en-US" altLang="zh-CN" sz="1400" dirty="0">
               <a:latin typeface="微软雅黑" pitchFamily="34" charset="-122"/>
               <a:ea typeface="微软雅黑" pitchFamily="34" charset="-122"/>
             </a:endParaRPr>
           </a:p>
           <a:p>
             <a:r>
-              <a:rPr lang="en-US" altLang="zh-CN" sz="1400" dirty="0" smtClean="0">
+              <a:rPr lang="en-US" altLang="zh-CN" sz="1400" dirty="0">
                 <a:latin typeface="微软雅黑" pitchFamily="34" charset="-122"/>
                 <a:ea typeface="微软雅黑" pitchFamily="34" charset="-122"/>
               </a:rPr>
               <a:t>SYN=1</a:t>
             </a:r>
             <a:r>
-              <a:rPr lang="zh-CN" altLang="en-US" sz="1400" dirty="0" smtClean="0">
+              <a:rPr lang="zh-CN" altLang="en-US" sz="1400" dirty="0">
                 <a:latin typeface="微软雅黑" pitchFamily="34" charset="-122"/>
                 <a:ea typeface="微软雅黑" pitchFamily="34" charset="-122"/>
               </a:rPr>
               <a:t>，</a:t>
             </a:r>
             <a:r>
-              <a:rPr lang="en-US" altLang="zh-CN" sz="1400" dirty="0" smtClean="0">
+              <a:rPr lang="en-US" altLang="zh-CN" sz="1400" dirty="0">
                 <a:latin typeface="微软雅黑" pitchFamily="34" charset="-122"/>
                 <a:ea typeface="微软雅黑" pitchFamily="34" charset="-122"/>
               </a:rPr>
               <a:t>ACK=1</a:t>
             </a:r>
             <a:r>
-              <a:rPr lang="zh-CN" altLang="en-US" sz="1400" dirty="0" smtClean="0">
+              <a:rPr lang="zh-CN" altLang="en-US" sz="1400" dirty="0">
                 <a:latin typeface="微软雅黑" pitchFamily="34" charset="-122"/>
                 <a:ea typeface="微软雅黑" pitchFamily="34" charset="-122"/>
               </a:rPr>
               <a:t>，</a:t>
             </a:r>
-            <a:endParaRPr lang="en-US" altLang="zh-CN" sz="1400" dirty="0" smtClean="0">
+            <a:endParaRPr lang="en-US" altLang="zh-CN" sz="1400" dirty="0">
               <a:latin typeface="微软雅黑" pitchFamily="34" charset="-122"/>
               <a:ea typeface="微软雅黑" pitchFamily="34" charset="-122"/>
             </a:endParaRPr>
           </a:p>
           <a:p>
             <a:r>
-              <a:rPr lang="en-US" altLang="zh-CN" sz="1400" dirty="0" err="1" smtClean="0">
+              <a:rPr lang="en-US" altLang="zh-CN" sz="1400" dirty="0" err="1">
                 <a:latin typeface="微软雅黑" pitchFamily="34" charset="-122"/>
                 <a:ea typeface="微软雅黑" pitchFamily="34" charset="-122"/>
               </a:rPr>
               <a:t>ack_seq</a:t>
             </a:r>
             <a:r>
-              <a:rPr lang="en-US" altLang="zh-CN" sz="1400" dirty="0" smtClean="0">
+              <a:rPr lang="en-US" altLang="zh-CN" sz="1400" dirty="0">
                 <a:latin typeface="微软雅黑" pitchFamily="34" charset="-122"/>
                 <a:ea typeface="微软雅黑" pitchFamily="34" charset="-122"/>
               </a:rPr>
               <a:t> = 3313457054</a:t>
             </a:r>
             <a:r>
-              <a:rPr lang="zh-CN" altLang="en-US" sz="1400" dirty="0" smtClean="0">
+              <a:rPr lang="zh-CN" altLang="en-US" sz="1400" dirty="0">
                 <a:latin typeface="微软雅黑" pitchFamily="34" charset="-122"/>
                 <a:ea typeface="微软雅黑" pitchFamily="34" charset="-122"/>
               </a:rPr>
               <a:t> </a:t>
             </a:r>
             <a:r>
-              <a:rPr lang="en-US" altLang="zh-CN" sz="1400" dirty="0" smtClean="0">
+              <a:rPr lang="en-US" altLang="zh-CN" sz="1400" dirty="0">
                 <a:latin typeface="微软雅黑" pitchFamily="34" charset="-122"/>
                 <a:ea typeface="微软雅黑" pitchFamily="34" charset="-122"/>
               </a:rPr>
               <a:t>= 3313457053 + 1(</a:t>
             </a:r>
             <a:r>
-              <a:rPr lang="zh-CN" altLang="en-US" sz="1400" dirty="0" smtClean="0">
+              <a:rPr lang="zh-CN" altLang="en-US" sz="1400" dirty="0">
                 <a:latin typeface="微软雅黑" pitchFamily="34" charset="-122"/>
                 <a:ea typeface="微软雅黑" pitchFamily="34" charset="-122"/>
               </a:rPr>
               <a:t>下图</a:t>
             </a:r>
             <a:r>
-              <a:rPr lang="en-US" altLang="zh-CN" sz="1400" dirty="0" smtClean="0">
-                <a:latin typeface="微软雅黑" pitchFamily="34" charset="-122"/>
-                <a:ea typeface="微软雅黑" pitchFamily="34" charset="-122"/>
-              </a:rPr>
-              <a:t>Acknowledgement </a:t>
-            </a:r>
-            <a:r>
               <a:rPr lang="en-US" altLang="zh-CN" sz="1400" dirty="0">
                 <a:latin typeface="微软雅黑" pitchFamily="34" charset="-122"/>
                 <a:ea typeface="微软雅黑" pitchFamily="34" charset="-122"/>
               </a:rPr>
-              <a:t>number (raw</a:t>
-            </a:r>
-            <a:r>
-              <a:rPr lang="en-US" altLang="zh-CN" sz="1400" dirty="0" smtClean="0">
-                <a:latin typeface="微软雅黑" pitchFamily="34" charset="-122"/>
-                <a:ea typeface="微软雅黑" pitchFamily="34" charset="-122"/>
-              </a:rPr>
-              <a:t>)</a:t>
+              <a:t>Acknowledgement number (raw)</a:t>
             </a:r>
           </a:p>
           <a:p>
@@ -4003,28 +4058,14 @@
                 <a:latin typeface="微软雅黑" pitchFamily="34" charset="-122"/>
                 <a:ea typeface="微软雅黑" pitchFamily="34" charset="-122"/>
               </a:rPr>
-              <a:t>s</a:t>
-            </a:r>
-            <a:r>
-              <a:rPr lang="en-US" altLang="zh-CN" sz="1400" dirty="0" err="1" smtClean="0">
-                <a:latin typeface="微软雅黑" pitchFamily="34" charset="-122"/>
-                <a:ea typeface="微软雅黑" pitchFamily="34" charset="-122"/>
-              </a:rPr>
-              <a:t>eq</a:t>
-            </a:r>
-            <a:r>
-              <a:rPr lang="en-US" altLang="zh-CN" sz="1400" dirty="0" smtClean="0">
-                <a:latin typeface="微软雅黑" pitchFamily="34" charset="-122"/>
-                <a:ea typeface="微软雅黑" pitchFamily="34" charset="-122"/>
-              </a:rPr>
-              <a:t> </a:t>
+              <a:t>seq</a:t>
             </a:r>
             <a:r>
               <a:rPr lang="en-US" altLang="zh-CN" sz="1400" dirty="0">
                 <a:latin typeface="微软雅黑" pitchFamily="34" charset="-122"/>
                 <a:ea typeface="微软雅黑" pitchFamily="34" charset="-122"/>
               </a:rPr>
-              <a:t>= 2422502078</a:t>
+              <a:t> = 2422502078</a:t>
             </a:r>
             <a:endParaRPr lang="zh-CN" altLang="en-US" sz="1400" dirty="0">
               <a:latin typeface="微软雅黑" pitchFamily="34" charset="-122"/>
@@ -4046,7 +4087,7 @@
 </p:sld>
 </file>
 
-<file path=ppt/slides/slide5.xml><?xml version="1.0" encoding="utf-8"?>
+<file path=ppt/slides/slide6.xml><?xml version="1.0" encoding="utf-8"?>
 <p:sld xmlns:a="http://schemas.openxmlformats.org/drawingml/2006/main" xmlns:r="http://schemas.openxmlformats.org/officeDocument/2006/relationships" xmlns:p="http://schemas.openxmlformats.org/presentationml/2006/main">
   <p:cSld>
     <p:spTree>

</xml_diff>